<commit_message>
Delays working in Izhikevich model
</commit_message>
<xml_diff>
--- a/thesis/Thesis Plan.pptx
+++ b/thesis/Thesis Plan.pptx
@@ -12,6 +12,7 @@
     <p:sldId id="260" r:id="rId6"/>
     <p:sldId id="259" r:id="rId7"/>
     <p:sldId id="261" r:id="rId8"/>
+    <p:sldId id="263" r:id="rId9"/>
   </p:sldIdLst>
   <p:sldSz cx="12192000" cy="6858000"/>
   <p:notesSz cx="6858000" cy="9144000"/>
@@ -110,6 +111,11 @@
       </a:defRPr>
     </a:lvl9pPr>
   </p:defaultTextStyle>
+  <p:extLst>
+    <p:ext uri="{EFAFB233-063F-42B5-8137-9DF3F51BA10A}">
+      <p15:sldGuideLst xmlns:p15="http://schemas.microsoft.com/office/powerpoint/2012/main"/>
+    </p:ext>
+  </p:extLst>
 </p:presentation>
 </file>
 
@@ -264,7 +270,7 @@
           <a:p>
             <a:fld id="{954492B9-D71C-4D72-9116-684F5B4E5326}" type="datetimeFigureOut">
               <a:rPr lang="en-US" smtClean="0"/>
-              <a:t>12/23/2017</a:t>
+              <a:t>12/26/2017</a:t>
             </a:fld>
             <a:endParaRPr lang="en-US"/>
           </a:p>
@@ -462,7 +468,7 @@
           <a:p>
             <a:fld id="{954492B9-D71C-4D72-9116-684F5B4E5326}" type="datetimeFigureOut">
               <a:rPr lang="en-US" smtClean="0"/>
-              <a:t>12/23/2017</a:t>
+              <a:t>12/26/2017</a:t>
             </a:fld>
             <a:endParaRPr lang="en-US"/>
           </a:p>
@@ -670,7 +676,7 @@
           <a:p>
             <a:fld id="{954492B9-D71C-4D72-9116-684F5B4E5326}" type="datetimeFigureOut">
               <a:rPr lang="en-US" smtClean="0"/>
-              <a:t>12/23/2017</a:t>
+              <a:t>12/26/2017</a:t>
             </a:fld>
             <a:endParaRPr lang="en-US"/>
           </a:p>
@@ -868,7 +874,7 @@
           <a:p>
             <a:fld id="{954492B9-D71C-4D72-9116-684F5B4E5326}" type="datetimeFigureOut">
               <a:rPr lang="en-US" smtClean="0"/>
-              <a:t>12/23/2017</a:t>
+              <a:t>12/26/2017</a:t>
             </a:fld>
             <a:endParaRPr lang="en-US"/>
           </a:p>
@@ -1143,7 +1149,7 @@
           <a:p>
             <a:fld id="{954492B9-D71C-4D72-9116-684F5B4E5326}" type="datetimeFigureOut">
               <a:rPr lang="en-US" smtClean="0"/>
-              <a:t>12/23/2017</a:t>
+              <a:t>12/26/2017</a:t>
             </a:fld>
             <a:endParaRPr lang="en-US"/>
           </a:p>
@@ -1408,7 +1414,7 @@
           <a:p>
             <a:fld id="{954492B9-D71C-4D72-9116-684F5B4E5326}" type="datetimeFigureOut">
               <a:rPr lang="en-US" smtClean="0"/>
-              <a:t>12/23/2017</a:t>
+              <a:t>12/26/2017</a:t>
             </a:fld>
             <a:endParaRPr lang="en-US"/>
           </a:p>
@@ -1820,7 +1826,7 @@
           <a:p>
             <a:fld id="{954492B9-D71C-4D72-9116-684F5B4E5326}" type="datetimeFigureOut">
               <a:rPr lang="en-US" smtClean="0"/>
-              <a:t>12/23/2017</a:t>
+              <a:t>12/26/2017</a:t>
             </a:fld>
             <a:endParaRPr lang="en-US"/>
           </a:p>
@@ -1961,7 +1967,7 @@
           <a:p>
             <a:fld id="{954492B9-D71C-4D72-9116-684F5B4E5326}" type="datetimeFigureOut">
               <a:rPr lang="en-US" smtClean="0"/>
-              <a:t>12/23/2017</a:t>
+              <a:t>12/26/2017</a:t>
             </a:fld>
             <a:endParaRPr lang="en-US"/>
           </a:p>
@@ -2074,7 +2080,7 @@
           <a:p>
             <a:fld id="{954492B9-D71C-4D72-9116-684F5B4E5326}" type="datetimeFigureOut">
               <a:rPr lang="en-US" smtClean="0"/>
-              <a:t>12/23/2017</a:t>
+              <a:t>12/26/2017</a:t>
             </a:fld>
             <a:endParaRPr lang="en-US"/>
           </a:p>
@@ -2385,7 +2391,7 @@
           <a:p>
             <a:fld id="{954492B9-D71C-4D72-9116-684F5B4E5326}" type="datetimeFigureOut">
               <a:rPr lang="en-US" smtClean="0"/>
-              <a:t>12/23/2017</a:t>
+              <a:t>12/26/2017</a:t>
             </a:fld>
             <a:endParaRPr lang="en-US"/>
           </a:p>
@@ -2673,7 +2679,7 @@
           <a:p>
             <a:fld id="{954492B9-D71C-4D72-9116-684F5B4E5326}" type="datetimeFigureOut">
               <a:rPr lang="en-US" smtClean="0"/>
-              <a:t>12/23/2017</a:t>
+              <a:t>12/26/2017</a:t>
             </a:fld>
             <a:endParaRPr lang="en-US"/>
           </a:p>
@@ -2914,7 +2920,7 @@
           <a:p>
             <a:fld id="{954492B9-D71C-4D72-9116-684F5B4E5326}" type="datetimeFigureOut">
               <a:rPr lang="en-US" smtClean="0"/>
-              <a:t>12/23/2017</a:t>
+              <a:t>12/26/2017</a:t>
             </a:fld>
             <a:endParaRPr lang="en-US"/>
           </a:p>
@@ -4763,6 +4769,222 @@
 </p:sld>
 </file>
 
+<file path=ppt/slides/slide8.xml><?xml version="1.0" encoding="utf-8"?>
+<p:sld xmlns:a="http://schemas.openxmlformats.org/drawingml/2006/main" xmlns:r="http://schemas.openxmlformats.org/officeDocument/2006/relationships" xmlns:p="http://schemas.openxmlformats.org/presentationml/2006/main">
+  <p:cSld>
+    <p:spTree>
+      <p:nvGrpSpPr>
+        <p:cNvPr id="1" name=""/>
+        <p:cNvGrpSpPr/>
+        <p:nvPr/>
+      </p:nvGrpSpPr>
+      <p:grpSpPr>
+        <a:xfrm>
+          <a:off x="0" y="0"/>
+          <a:ext cx="0" cy="0"/>
+          <a:chOff x="0" y="0"/>
+          <a:chExt cx="0" cy="0"/>
+        </a:xfrm>
+      </p:grpSpPr>
+      <p:sp>
+        <p:nvSpPr>
+          <p:cNvPr id="2" name="Title 1">
+            <a:extLst>
+              <a:ext uri="{FF2B5EF4-FFF2-40B4-BE49-F238E27FC236}">
+                <a16:creationId xmlns:a16="http://schemas.microsoft.com/office/drawing/2014/main" id="{ABAC5207-9B5E-42DE-B989-FE8B9CDAFDEA}"/>
+              </a:ext>
+            </a:extLst>
+          </p:cNvPr>
+          <p:cNvSpPr>
+            <a:spLocks noGrp="1"/>
+          </p:cNvSpPr>
+          <p:nvPr>
+            <p:ph type="title"/>
+          </p:nvPr>
+        </p:nvSpPr>
+        <p:spPr/>
+        <p:txBody>
+          <a:bodyPr/>
+          <a:lstStyle/>
+          <a:p>
+            <a:r>
+              <a:rPr lang="en-US" dirty="0"/>
+              <a:t>Initial model: </a:t>
+            </a:r>
+            <a:r>
+              <a:rPr lang="en-US" dirty="0" err="1"/>
+              <a:t>Izhikevich</a:t>
+            </a:r>
+            <a:endParaRPr lang="en-US" dirty="0"/>
+          </a:p>
+        </p:txBody>
+      </p:sp>
+      <p:pic>
+        <p:nvPicPr>
+          <p:cNvPr id="4" name="Picture 3">
+            <a:extLst>
+              <a:ext uri="{FF2B5EF4-FFF2-40B4-BE49-F238E27FC236}">
+                <a16:creationId xmlns:a16="http://schemas.microsoft.com/office/drawing/2014/main" id="{38E3F87A-A757-4484-83DF-E021ECC4E018}"/>
+              </a:ext>
+            </a:extLst>
+          </p:cNvPr>
+          <p:cNvPicPr>
+            <a:picLocks noChangeAspect="1"/>
+          </p:cNvPicPr>
+          <p:nvPr/>
+        </p:nvPicPr>
+        <p:blipFill rotWithShape="1">
+          <a:blip r:embed="rId2">
+            <a:extLst>
+              <a:ext uri="{28A0092B-C50C-407E-A947-70E740481C1C}">
+                <a14:useLocalDpi xmlns:a14="http://schemas.microsoft.com/office/drawing/2010/main" val="0"/>
+              </a:ext>
+            </a:extLst>
+          </a:blip>
+          <a:srcRect r="4684"/>
+          <a:stretch/>
+        </p:blipFill>
+        <p:spPr>
+          <a:xfrm>
+            <a:off x="5971950" y="2767914"/>
+            <a:ext cx="4550226" cy="3718652"/>
+          </a:xfrm>
+          <a:prstGeom prst="rect">
+            <a:avLst/>
+          </a:prstGeom>
+        </p:spPr>
+      </p:pic>
+      <p:pic>
+        <p:nvPicPr>
+          <p:cNvPr id="6" name="Picture 5">
+            <a:extLst>
+              <a:ext uri="{FF2B5EF4-FFF2-40B4-BE49-F238E27FC236}">
+                <a16:creationId xmlns:a16="http://schemas.microsoft.com/office/drawing/2014/main" id="{E272EF9D-4133-4988-B2C6-1AB321C47039}"/>
+              </a:ext>
+            </a:extLst>
+          </p:cNvPr>
+          <p:cNvPicPr>
+            <a:picLocks noChangeAspect="1"/>
+          </p:cNvPicPr>
+          <p:nvPr/>
+        </p:nvPicPr>
+        <p:blipFill rotWithShape="1">
+          <a:blip r:embed="rId3">
+            <a:extLst>
+              <a:ext uri="{28A0092B-C50C-407E-A947-70E740481C1C}">
+                <a14:useLocalDpi xmlns:a14="http://schemas.microsoft.com/office/drawing/2010/main" val="0"/>
+              </a:ext>
+            </a:extLst>
+          </a:blip>
+          <a:srcRect l="1764" r="4761"/>
+          <a:stretch/>
+        </p:blipFill>
+        <p:spPr>
+          <a:xfrm>
+            <a:off x="974104" y="2762053"/>
+            <a:ext cx="4462342" cy="3730821"/>
+          </a:xfrm>
+          <a:prstGeom prst="rect">
+            <a:avLst/>
+          </a:prstGeom>
+        </p:spPr>
+      </p:pic>
+      <p:sp>
+        <p:nvSpPr>
+          <p:cNvPr id="7" name="TextBox 6">
+            <a:extLst>
+              <a:ext uri="{FF2B5EF4-FFF2-40B4-BE49-F238E27FC236}">
+                <a16:creationId xmlns:a16="http://schemas.microsoft.com/office/drawing/2014/main" id="{DEDD41B8-5079-4FDE-A137-E8B20EF2DE39}"/>
+              </a:ext>
+            </a:extLst>
+          </p:cNvPr>
+          <p:cNvSpPr txBox="1"/>
+          <p:nvPr/>
+        </p:nvSpPr>
+        <p:spPr>
+          <a:xfrm>
+            <a:off x="2061759" y="2409887"/>
+            <a:ext cx="2428293" cy="369332"/>
+          </a:xfrm>
+          <a:prstGeom prst="rect">
+            <a:avLst/>
+          </a:prstGeom>
+          <a:noFill/>
+        </p:spPr>
+        <p:txBody>
+          <a:bodyPr wrap="none" rtlCol="0">
+            <a:spAutoFit/>
+          </a:bodyPr>
+          <a:lstStyle/>
+          <a:p>
+            <a:r>
+              <a:rPr lang="en-US" dirty="0"/>
+              <a:t>Classic </a:t>
+            </a:r>
+            <a:r>
+              <a:rPr lang="en-US" dirty="0" err="1"/>
+              <a:t>Izhikevich</a:t>
+            </a:r>
+            <a:r>
+              <a:rPr lang="en-US" dirty="0"/>
+              <a:t> (2003)</a:t>
+            </a:r>
+          </a:p>
+        </p:txBody>
+      </p:sp>
+      <p:sp>
+        <p:nvSpPr>
+          <p:cNvPr id="8" name="TextBox 7">
+            <a:extLst>
+              <a:ext uri="{FF2B5EF4-FFF2-40B4-BE49-F238E27FC236}">
+                <a16:creationId xmlns:a16="http://schemas.microsoft.com/office/drawing/2014/main" id="{C7B9CA4D-B714-490D-B85D-B3D9D4E8CBD7}"/>
+              </a:ext>
+            </a:extLst>
+          </p:cNvPr>
+          <p:cNvSpPr txBox="1"/>
+          <p:nvPr/>
+        </p:nvSpPr>
+        <p:spPr>
+          <a:xfrm>
+            <a:off x="6611833" y="2409887"/>
+            <a:ext cx="3736600" cy="369332"/>
+          </a:xfrm>
+          <a:prstGeom prst="rect">
+            <a:avLst/>
+          </a:prstGeom>
+          <a:noFill/>
+        </p:spPr>
+        <p:txBody>
+          <a:bodyPr wrap="none" rtlCol="0">
+            <a:spAutoFit/>
+          </a:bodyPr>
+          <a:lstStyle/>
+          <a:p>
+            <a:r>
+              <a:rPr lang="en-US" dirty="0"/>
+              <a:t>Added random synaptic delays 0-4 </a:t>
+            </a:r>
+            <a:r>
+              <a:rPr lang="en-US" dirty="0" err="1"/>
+              <a:t>ms</a:t>
+            </a:r>
+            <a:endParaRPr lang="en-US" dirty="0"/>
+          </a:p>
+        </p:txBody>
+      </p:sp>
+    </p:spTree>
+    <p:extLst>
+      <p:ext uri="{BB962C8B-B14F-4D97-AF65-F5344CB8AC3E}">
+        <p14:creationId xmlns:p14="http://schemas.microsoft.com/office/powerpoint/2010/main" val="3801376647"/>
+      </p:ext>
+    </p:extLst>
+  </p:cSld>
+  <p:clrMapOvr>
+    <a:masterClrMapping/>
+  </p:clrMapOvr>
+</p:sld>
+</file>
+
 <file path=ppt/theme/theme1.xml><?xml version="1.0" encoding="utf-8"?>
 <a:theme xmlns:a="http://schemas.openxmlformats.org/drawingml/2006/main" name="Office Theme">
   <a:themeElements>

</xml_diff>

<commit_message>
Updates to thesis plan
</commit_message>
<xml_diff>
--- a/thesis/Thesis Plan.pptx
+++ b/thesis/Thesis Plan.pptx
@@ -13,6 +13,7 @@
     <p:sldId id="259" r:id="rId7"/>
     <p:sldId id="261" r:id="rId8"/>
     <p:sldId id="263" r:id="rId9"/>
+    <p:sldId id="264" r:id="rId10"/>
   </p:sldIdLst>
   <p:sldSz cx="12192000" cy="6858000"/>
   <p:notesSz cx="6858000" cy="9144000"/>
@@ -270,7 +271,7 @@
           <a:p>
             <a:fld id="{954492B9-D71C-4D72-9116-684F5B4E5326}" type="datetimeFigureOut">
               <a:rPr lang="en-US" smtClean="0"/>
-              <a:t>12/26/2017</a:t>
+              <a:t>12/30/2017</a:t>
             </a:fld>
             <a:endParaRPr lang="en-US"/>
           </a:p>
@@ -468,7 +469,7 @@
           <a:p>
             <a:fld id="{954492B9-D71C-4D72-9116-684F5B4E5326}" type="datetimeFigureOut">
               <a:rPr lang="en-US" smtClean="0"/>
-              <a:t>12/26/2017</a:t>
+              <a:t>12/30/2017</a:t>
             </a:fld>
             <a:endParaRPr lang="en-US"/>
           </a:p>
@@ -676,7 +677,7 @@
           <a:p>
             <a:fld id="{954492B9-D71C-4D72-9116-684F5B4E5326}" type="datetimeFigureOut">
               <a:rPr lang="en-US" smtClean="0"/>
-              <a:t>12/26/2017</a:t>
+              <a:t>12/30/2017</a:t>
             </a:fld>
             <a:endParaRPr lang="en-US"/>
           </a:p>
@@ -874,7 +875,7 @@
           <a:p>
             <a:fld id="{954492B9-D71C-4D72-9116-684F5B4E5326}" type="datetimeFigureOut">
               <a:rPr lang="en-US" smtClean="0"/>
-              <a:t>12/26/2017</a:t>
+              <a:t>12/30/2017</a:t>
             </a:fld>
             <a:endParaRPr lang="en-US"/>
           </a:p>
@@ -1149,7 +1150,7 @@
           <a:p>
             <a:fld id="{954492B9-D71C-4D72-9116-684F5B4E5326}" type="datetimeFigureOut">
               <a:rPr lang="en-US" smtClean="0"/>
-              <a:t>12/26/2017</a:t>
+              <a:t>12/30/2017</a:t>
             </a:fld>
             <a:endParaRPr lang="en-US"/>
           </a:p>
@@ -1414,7 +1415,7 @@
           <a:p>
             <a:fld id="{954492B9-D71C-4D72-9116-684F5B4E5326}" type="datetimeFigureOut">
               <a:rPr lang="en-US" smtClean="0"/>
-              <a:t>12/26/2017</a:t>
+              <a:t>12/30/2017</a:t>
             </a:fld>
             <a:endParaRPr lang="en-US"/>
           </a:p>
@@ -1826,7 +1827,7 @@
           <a:p>
             <a:fld id="{954492B9-D71C-4D72-9116-684F5B4E5326}" type="datetimeFigureOut">
               <a:rPr lang="en-US" smtClean="0"/>
-              <a:t>12/26/2017</a:t>
+              <a:t>12/30/2017</a:t>
             </a:fld>
             <a:endParaRPr lang="en-US"/>
           </a:p>
@@ -1967,7 +1968,7 @@
           <a:p>
             <a:fld id="{954492B9-D71C-4D72-9116-684F5B4E5326}" type="datetimeFigureOut">
               <a:rPr lang="en-US" smtClean="0"/>
-              <a:t>12/26/2017</a:t>
+              <a:t>12/30/2017</a:t>
             </a:fld>
             <a:endParaRPr lang="en-US"/>
           </a:p>
@@ -2080,7 +2081,7 @@
           <a:p>
             <a:fld id="{954492B9-D71C-4D72-9116-684F5B4E5326}" type="datetimeFigureOut">
               <a:rPr lang="en-US" smtClean="0"/>
-              <a:t>12/26/2017</a:t>
+              <a:t>12/30/2017</a:t>
             </a:fld>
             <a:endParaRPr lang="en-US"/>
           </a:p>
@@ -2391,7 +2392,7 @@
           <a:p>
             <a:fld id="{954492B9-D71C-4D72-9116-684F5B4E5326}" type="datetimeFigureOut">
               <a:rPr lang="en-US" smtClean="0"/>
-              <a:t>12/26/2017</a:t>
+              <a:t>12/30/2017</a:t>
             </a:fld>
             <a:endParaRPr lang="en-US"/>
           </a:p>
@@ -2679,7 +2680,7 @@
           <a:p>
             <a:fld id="{954492B9-D71C-4D72-9116-684F5B4E5326}" type="datetimeFigureOut">
               <a:rPr lang="en-US" smtClean="0"/>
-              <a:t>12/26/2017</a:t>
+              <a:t>12/30/2017</a:t>
             </a:fld>
             <a:endParaRPr lang="en-US"/>
           </a:p>
@@ -2920,7 +2921,7 @@
           <a:p>
             <a:fld id="{954492B9-D71C-4D72-9116-684F5B4E5326}" type="datetimeFigureOut">
               <a:rPr lang="en-US" smtClean="0"/>
-              <a:t>12/26/2017</a:t>
+              <a:t>12/30/2017</a:t>
             </a:fld>
             <a:endParaRPr lang="en-US"/>
           </a:p>
@@ -4947,7 +4948,7 @@
         <p:spPr>
           <a:xfrm>
             <a:off x="6611833" y="2409887"/>
-            <a:ext cx="3736600" cy="369332"/>
+            <a:ext cx="3579506" cy="369332"/>
           </a:xfrm>
           <a:prstGeom prst="rect">
             <a:avLst/>
@@ -4962,7 +4963,7 @@
           <a:p>
             <a:r>
               <a:rPr lang="en-US" dirty="0"/>
-              <a:t>Added random synaptic delays 0-4 </a:t>
+              <a:t>With random synaptic delays 0-4 </a:t>
             </a:r>
             <a:r>
               <a:rPr lang="en-US" dirty="0" err="1"/>
@@ -4976,6 +4977,527 @@
     <p:extLst>
       <p:ext uri="{BB962C8B-B14F-4D97-AF65-F5344CB8AC3E}">
         <p14:creationId xmlns:p14="http://schemas.microsoft.com/office/powerpoint/2010/main" val="3801376647"/>
+      </p:ext>
+    </p:extLst>
+  </p:cSld>
+  <p:clrMapOvr>
+    <a:masterClrMapping/>
+  </p:clrMapOvr>
+</p:sld>
+</file>
+
+<file path=ppt/slides/slide9.xml><?xml version="1.0" encoding="utf-8"?>
+<p:sld xmlns:a="http://schemas.openxmlformats.org/drawingml/2006/main" xmlns:r="http://schemas.openxmlformats.org/officeDocument/2006/relationships" xmlns:p="http://schemas.openxmlformats.org/presentationml/2006/main">
+  <p:cSld>
+    <p:spTree>
+      <p:nvGrpSpPr>
+        <p:cNvPr id="1" name=""/>
+        <p:cNvGrpSpPr/>
+        <p:nvPr/>
+      </p:nvGrpSpPr>
+      <p:grpSpPr>
+        <a:xfrm>
+          <a:off x="0" y="0"/>
+          <a:ext cx="0" cy="0"/>
+          <a:chOff x="0" y="0"/>
+          <a:chExt cx="0" cy="0"/>
+        </a:xfrm>
+      </p:grpSpPr>
+      <p:sp>
+        <p:nvSpPr>
+          <p:cNvPr id="2" name="Title 1">
+            <a:extLst>
+              <a:ext uri="{FF2B5EF4-FFF2-40B4-BE49-F238E27FC236}">
+                <a16:creationId xmlns:a16="http://schemas.microsoft.com/office/drawing/2014/main" id="{2B4589EA-8981-4D8B-BFF9-EF6B5CEB43F6}"/>
+              </a:ext>
+            </a:extLst>
+          </p:cNvPr>
+          <p:cNvSpPr>
+            <a:spLocks noGrp="1"/>
+          </p:cNvSpPr>
+          <p:nvPr>
+            <p:ph type="title"/>
+          </p:nvPr>
+        </p:nvSpPr>
+        <p:spPr/>
+        <p:txBody>
+          <a:bodyPr/>
+          <a:lstStyle/>
+          <a:p>
+            <a:r>
+              <a:rPr lang="en-US" dirty="0"/>
+              <a:t>Neural connectivity</a:t>
+            </a:r>
+          </a:p>
+        </p:txBody>
+      </p:sp>
+      <p:grpSp>
+        <p:nvGrpSpPr>
+          <p:cNvPr id="11" name="Group 10">
+            <a:extLst>
+              <a:ext uri="{FF2B5EF4-FFF2-40B4-BE49-F238E27FC236}">
+                <a16:creationId xmlns:a16="http://schemas.microsoft.com/office/drawing/2014/main" id="{C27BBC6F-3490-477E-8494-21469B69C214}"/>
+              </a:ext>
+            </a:extLst>
+          </p:cNvPr>
+          <p:cNvGrpSpPr/>
+          <p:nvPr/>
+        </p:nvGrpSpPr>
+        <p:grpSpPr>
+          <a:xfrm>
+            <a:off x="167802" y="2967880"/>
+            <a:ext cx="11802493" cy="4019952"/>
+            <a:chOff x="167802" y="2659872"/>
+            <a:chExt cx="11802493" cy="4019952"/>
+          </a:xfrm>
+        </p:grpSpPr>
+        <p:pic>
+          <p:nvPicPr>
+            <p:cNvPr id="4" name="Picture 3">
+              <a:extLst>
+                <a:ext uri="{FF2B5EF4-FFF2-40B4-BE49-F238E27FC236}">
+                  <a16:creationId xmlns:a16="http://schemas.microsoft.com/office/drawing/2014/main" id="{2586738C-618A-4C35-98F4-DE8DD67C07DC}"/>
+                </a:ext>
+              </a:extLst>
+            </p:cNvPr>
+            <p:cNvPicPr>
+              <a:picLocks noChangeAspect="1"/>
+            </p:cNvPicPr>
+            <p:nvPr/>
+          </p:nvPicPr>
+          <p:blipFill>
+            <a:blip r:embed="rId2">
+              <a:extLst>
+                <a:ext uri="{28A0092B-C50C-407E-A947-70E740481C1C}">
+                  <a14:useLocalDpi xmlns:a14="http://schemas.microsoft.com/office/drawing/2010/main" val="0"/>
+                </a:ext>
+              </a:extLst>
+            </a:blip>
+            <a:stretch>
+              <a:fillRect/>
+            </a:stretch>
+          </p:blipFill>
+          <p:spPr>
+            <a:xfrm>
+              <a:off x="167802" y="2667787"/>
+              <a:ext cx="3009028" cy="4012037"/>
+            </a:xfrm>
+            <a:prstGeom prst="rect">
+              <a:avLst/>
+            </a:prstGeom>
+          </p:spPr>
+        </p:pic>
+        <p:pic>
+          <p:nvPicPr>
+            <p:cNvPr id="6" name="Picture 5">
+              <a:extLst>
+                <a:ext uri="{FF2B5EF4-FFF2-40B4-BE49-F238E27FC236}">
+                  <a16:creationId xmlns:a16="http://schemas.microsoft.com/office/drawing/2014/main" id="{6FDD1A8E-7A14-4A69-A89F-C48D23E58495}"/>
+                </a:ext>
+              </a:extLst>
+            </p:cNvPr>
+            <p:cNvPicPr>
+              <a:picLocks noChangeAspect="1"/>
+            </p:cNvPicPr>
+            <p:nvPr/>
+          </p:nvPicPr>
+          <p:blipFill>
+            <a:blip r:embed="rId3">
+              <a:extLst>
+                <a:ext uri="{28A0092B-C50C-407E-A947-70E740481C1C}">
+                  <a14:useLocalDpi xmlns:a14="http://schemas.microsoft.com/office/drawing/2010/main" val="0"/>
+                </a:ext>
+              </a:extLst>
+            </a:blip>
+            <a:stretch>
+              <a:fillRect/>
+            </a:stretch>
+          </p:blipFill>
+          <p:spPr>
+            <a:xfrm>
+              <a:off x="3124922" y="2667786"/>
+              <a:ext cx="3009028" cy="4012037"/>
+            </a:xfrm>
+            <a:prstGeom prst="rect">
+              <a:avLst/>
+            </a:prstGeom>
+          </p:spPr>
+        </p:pic>
+        <p:pic>
+          <p:nvPicPr>
+            <p:cNvPr id="8" name="Picture 7">
+              <a:extLst>
+                <a:ext uri="{FF2B5EF4-FFF2-40B4-BE49-F238E27FC236}">
+                  <a16:creationId xmlns:a16="http://schemas.microsoft.com/office/drawing/2014/main" id="{10EB060F-ED99-45D3-9BB2-BF5E00DF35DD}"/>
+                </a:ext>
+              </a:extLst>
+            </p:cNvPr>
+            <p:cNvPicPr>
+              <a:picLocks noChangeAspect="1"/>
+            </p:cNvPicPr>
+            <p:nvPr/>
+          </p:nvPicPr>
+          <p:blipFill>
+            <a:blip r:embed="rId4">
+              <a:extLst>
+                <a:ext uri="{28A0092B-C50C-407E-A947-70E740481C1C}">
+                  <a14:useLocalDpi xmlns:a14="http://schemas.microsoft.com/office/drawing/2010/main" val="0"/>
+                </a:ext>
+              </a:extLst>
+            </a:blip>
+            <a:stretch>
+              <a:fillRect/>
+            </a:stretch>
+          </p:blipFill>
+          <p:spPr>
+            <a:xfrm>
+              <a:off x="6082042" y="2659872"/>
+              <a:ext cx="2924485" cy="3955490"/>
+            </a:xfrm>
+            <a:prstGeom prst="rect">
+              <a:avLst/>
+            </a:prstGeom>
+          </p:spPr>
+        </p:pic>
+        <p:pic>
+          <p:nvPicPr>
+            <p:cNvPr id="10" name="Picture 9">
+              <a:extLst>
+                <a:ext uri="{FF2B5EF4-FFF2-40B4-BE49-F238E27FC236}">
+                  <a16:creationId xmlns:a16="http://schemas.microsoft.com/office/drawing/2014/main" id="{E19EC181-8761-4482-AC58-05BD0979493D}"/>
+                </a:ext>
+              </a:extLst>
+            </p:cNvPr>
+            <p:cNvPicPr>
+              <a:picLocks noChangeAspect="1"/>
+            </p:cNvPicPr>
+            <p:nvPr/>
+          </p:nvPicPr>
+          <p:blipFill>
+            <a:blip r:embed="rId5">
+              <a:extLst>
+                <a:ext uri="{28A0092B-C50C-407E-A947-70E740481C1C}">
+                  <a14:useLocalDpi xmlns:a14="http://schemas.microsoft.com/office/drawing/2010/main" val="0"/>
+                </a:ext>
+              </a:extLst>
+            </a:blip>
+            <a:stretch>
+              <a:fillRect/>
+            </a:stretch>
+          </p:blipFill>
+          <p:spPr>
+            <a:xfrm>
+              <a:off x="8961268" y="2667784"/>
+              <a:ext cx="3009027" cy="4012036"/>
+            </a:xfrm>
+            <a:prstGeom prst="rect">
+              <a:avLst/>
+            </a:prstGeom>
+          </p:spPr>
+        </p:pic>
+      </p:grpSp>
+      <mc:AlternateContent xmlns:mc="http://schemas.openxmlformats.org/markup-compatibility/2006">
+        <mc:Choice xmlns:a14="http://schemas.microsoft.com/office/drawing/2010/main" Requires="a14">
+          <p:sp>
+            <p:nvSpPr>
+              <p:cNvPr id="12" name="TextBox 11">
+                <a:extLst>
+                  <a:ext uri="{FF2B5EF4-FFF2-40B4-BE49-F238E27FC236}">
+                    <a16:creationId xmlns:a16="http://schemas.microsoft.com/office/drawing/2014/main" id="{32093033-12DB-4973-AEA5-F1D6B322CD25}"/>
+                  </a:ext>
+                </a:extLst>
+              </p:cNvPr>
+              <p:cNvSpPr txBox="1"/>
+              <p:nvPr/>
+            </p:nvSpPr>
+            <p:spPr>
+              <a:xfrm>
+                <a:off x="1319134" y="1538949"/>
+                <a:ext cx="6696705" cy="1062214"/>
+              </a:xfrm>
+              <a:prstGeom prst="rect">
+                <a:avLst/>
+              </a:prstGeom>
+              <a:noFill/>
+            </p:spPr>
+            <p:txBody>
+              <a:bodyPr wrap="none" rtlCol="0">
+                <a:spAutoFit/>
+              </a:bodyPr>
+              <a:lstStyle/>
+              <a:p>
+                <a:r>
+                  <a:rPr lang="en-US" dirty="0"/>
+                  <a:t>Connection probability depends on neuron distance, </a:t>
+                </a:r>
+                <a14:m>
+                  <m:oMath xmlns:m="http://schemas.openxmlformats.org/officeDocument/2006/math">
+                    <m:sSub>
+                      <m:sSubPr>
+                        <m:ctrlPr>
+                          <a:rPr lang="en-US" b="0" i="1" smtClean="0">
+                            <a:latin typeface="Cambria Math" panose="02040503050406030204" pitchFamily="18" charset="0"/>
+                          </a:rPr>
+                        </m:ctrlPr>
+                      </m:sSubPr>
+                      <m:e>
+                        <m:r>
+                          <a:rPr lang="en-US" b="0" i="1" smtClean="0">
+                            <a:latin typeface="Cambria Math" panose="02040503050406030204" pitchFamily="18" charset="0"/>
+                          </a:rPr>
+                          <m:t>𝑃</m:t>
+                        </m:r>
+                      </m:e>
+                      <m:sub>
+                        <m:r>
+                          <a:rPr lang="en-US" b="0" i="1" smtClean="0">
+                            <a:latin typeface="Cambria Math" panose="02040503050406030204" pitchFamily="18" charset="0"/>
+                          </a:rPr>
+                          <m:t>12</m:t>
+                        </m:r>
+                      </m:sub>
+                    </m:sSub>
+                    <m:r>
+                      <a:rPr lang="en-US" b="0" i="1" smtClean="0">
+                        <a:latin typeface="Cambria Math" panose="02040503050406030204" pitchFamily="18" charset="0"/>
+                      </a:rPr>
+                      <m:t>=</m:t>
+                    </m:r>
+                    <m:sSup>
+                      <m:sSupPr>
+                        <m:ctrlPr>
+                          <a:rPr lang="en-US" i="1">
+                            <a:latin typeface="Cambria Math" panose="02040503050406030204" pitchFamily="18" charset="0"/>
+                          </a:rPr>
+                        </m:ctrlPr>
+                      </m:sSupPr>
+                      <m:e>
+                        <m:r>
+                          <a:rPr lang="en-US" i="1">
+                            <a:latin typeface="Cambria Math" panose="02040503050406030204" pitchFamily="18" charset="0"/>
+                          </a:rPr>
+                          <m:t>𝑒</m:t>
+                        </m:r>
+                      </m:e>
+                      <m:sup>
+                        <m:r>
+                          <a:rPr lang="en-US" i="1">
+                            <a:latin typeface="Cambria Math" panose="02040503050406030204" pitchFamily="18" charset="0"/>
+                          </a:rPr>
+                          <m:t>−</m:t>
+                        </m:r>
+                        <m:d>
+                          <m:dPr>
+                            <m:ctrlPr>
+                              <a:rPr lang="en-US" i="1">
+                                <a:latin typeface="Cambria Math" panose="02040503050406030204" pitchFamily="18" charset="0"/>
+                              </a:rPr>
+                            </m:ctrlPr>
+                          </m:dPr>
+                          <m:e>
+                            <m:f>
+                              <m:fPr>
+                                <m:type m:val="skw"/>
+                                <m:ctrlPr>
+                                  <a:rPr lang="en-US" i="1" smtClean="0">
+                                    <a:latin typeface="Cambria Math" panose="02040503050406030204" pitchFamily="18" charset="0"/>
+                                  </a:rPr>
+                                </m:ctrlPr>
+                              </m:fPr>
+                              <m:num>
+                                <m:sSub>
+                                  <m:sSubPr>
+                                    <m:ctrlPr>
+                                      <a:rPr lang="en-US" i="1" smtClean="0">
+                                        <a:latin typeface="Cambria Math" panose="02040503050406030204" pitchFamily="18" charset="0"/>
+                                      </a:rPr>
+                                    </m:ctrlPr>
+                                  </m:sSubPr>
+                                  <m:e>
+                                    <m:r>
+                                      <a:rPr lang="en-US" b="0" i="1" smtClean="0">
+                                        <a:latin typeface="Cambria Math" panose="02040503050406030204" pitchFamily="18" charset="0"/>
+                                      </a:rPr>
+                                      <m:t>𝐷</m:t>
+                                    </m:r>
+                                  </m:e>
+                                  <m:sub>
+                                    <m:r>
+                                      <a:rPr lang="en-US" b="0" i="1" smtClean="0">
+                                        <a:latin typeface="Cambria Math" panose="02040503050406030204" pitchFamily="18" charset="0"/>
+                                      </a:rPr>
+                                      <m:t>12</m:t>
+                                    </m:r>
+                                  </m:sub>
+                                </m:sSub>
+                              </m:num>
+                              <m:den>
+                                <m:r>
+                                  <m:rPr>
+                                    <m:nor/>
+                                  </m:rPr>
+                                  <a:rPr lang="el-GR" dirty="0"/>
+                                  <m:t>λ</m:t>
+                                </m:r>
+                              </m:den>
+                            </m:f>
+                          </m:e>
+                        </m:d>
+                        <m:r>
+                          <a:rPr lang="en-US" i="1">
+                            <a:latin typeface="Cambria Math" panose="02040503050406030204" pitchFamily="18" charset="0"/>
+                          </a:rPr>
+                          <m:t>2</m:t>
+                        </m:r>
+                      </m:sup>
+                    </m:sSup>
+                  </m:oMath>
+                </a14:m>
+                <a:endParaRPr lang="en-US" dirty="0"/>
+              </a:p>
+              <a:p>
+                <a:r>
+                  <a:rPr lang="en-US" dirty="0"/>
+                  <a:t>Original LSM paper (Maas 2002) found best performance for </a:t>
+                </a:r>
+                <a:r>
+                  <a:rPr lang="el-GR" dirty="0"/>
+                  <a:t>λ</a:t>
+                </a:r>
+                <a:r>
+                  <a:rPr lang="en-US" dirty="0"/>
+                  <a:t>=2</a:t>
+                </a:r>
+              </a:p>
+              <a:p>
+                <a:r>
+                  <a:rPr lang="en-US" dirty="0"/>
+                  <a:t>3x3x15 column on integer grid locations, 135 neurons</a:t>
+                </a:r>
+              </a:p>
+            </p:txBody>
+          </p:sp>
+        </mc:Choice>
+        <mc:Fallback>
+          <p:sp>
+            <p:nvSpPr>
+              <p:cNvPr id="12" name="TextBox 11">
+                <a:extLst>
+                  <a:ext uri="{FF2B5EF4-FFF2-40B4-BE49-F238E27FC236}">
+                    <a16:creationId xmlns:a16="http://schemas.microsoft.com/office/drawing/2014/main" id="{32093033-12DB-4973-AEA5-F1D6B322CD25}"/>
+                  </a:ext>
+                </a:extLst>
+              </p:cNvPr>
+              <p:cNvSpPr txBox="1">
+                <a:spLocks noRot="1" noChangeAspect="1" noMove="1" noResize="1" noEditPoints="1" noAdjustHandles="1" noChangeArrowheads="1" noChangeShapeType="1" noTextEdit="1"/>
+              </p:cNvSpPr>
+              <p:nvPr/>
+            </p:nvSpPr>
+            <p:spPr>
+              <a:xfrm>
+                <a:off x="1319134" y="1538949"/>
+                <a:ext cx="6696705" cy="1062214"/>
+              </a:xfrm>
+              <a:prstGeom prst="rect">
+                <a:avLst/>
+              </a:prstGeom>
+              <a:blipFill>
+                <a:blip r:embed="rId6"/>
+                <a:stretch>
+                  <a:fillRect l="-728" b="-8000"/>
+                </a:stretch>
+              </a:blipFill>
+            </p:spPr>
+            <p:txBody>
+              <a:bodyPr/>
+              <a:lstStyle/>
+              <a:p>
+                <a:r>
+                  <a:rPr lang="en-US">
+                    <a:noFill/>
+                  </a:rPr>
+                  <a:t> </a:t>
+                </a:r>
+              </a:p>
+            </p:txBody>
+          </p:sp>
+        </mc:Fallback>
+      </mc:AlternateContent>
+      <p:pic>
+        <p:nvPicPr>
+          <p:cNvPr id="13" name="Picture 12">
+            <a:extLst>
+              <a:ext uri="{FF2B5EF4-FFF2-40B4-BE49-F238E27FC236}">
+                <a16:creationId xmlns:a16="http://schemas.microsoft.com/office/drawing/2014/main" id="{2C014946-5F99-4ED7-BBC6-2610D83D2C61}"/>
+              </a:ext>
+            </a:extLst>
+          </p:cNvPr>
+          <p:cNvPicPr>
+            <a:picLocks noChangeAspect="1"/>
+          </p:cNvPicPr>
+          <p:nvPr/>
+        </p:nvPicPr>
+        <p:blipFill rotWithShape="1">
+          <a:blip r:embed="rId7"/>
+          <a:srcRect l="40816" t="17845" r="42368" b="54604"/>
+          <a:stretch/>
+        </p:blipFill>
+        <p:spPr>
+          <a:xfrm>
+            <a:off x="8961268" y="1171711"/>
+            <a:ext cx="2088683" cy="1833727"/>
+          </a:xfrm>
+          <a:prstGeom prst="rect">
+            <a:avLst/>
+          </a:prstGeom>
+        </p:spPr>
+      </p:pic>
+      <p:cxnSp>
+        <p:nvCxnSpPr>
+          <p:cNvPr id="15" name="Straight Arrow Connector 14">
+            <a:extLst>
+              <a:ext uri="{FF2B5EF4-FFF2-40B4-BE49-F238E27FC236}">
+                <a16:creationId xmlns:a16="http://schemas.microsoft.com/office/drawing/2014/main" id="{ED8A61D4-2AA1-4259-A52B-A0B463AB14DA}"/>
+              </a:ext>
+            </a:extLst>
+          </p:cNvPr>
+          <p:cNvCxnSpPr/>
+          <p:nvPr/>
+        </p:nvCxnSpPr>
+        <p:spPr>
+          <a:xfrm>
+            <a:off x="7516141" y="2147227"/>
+            <a:ext cx="1232034" cy="0"/>
+          </a:xfrm>
+          <a:prstGeom prst="straightConnector1">
+            <a:avLst/>
+          </a:prstGeom>
+          <a:ln w="19050">
+            <a:solidFill>
+              <a:schemeClr val="tx1"/>
+            </a:solidFill>
+            <a:tailEnd type="triangle"/>
+          </a:ln>
+        </p:spPr>
+        <p:style>
+          <a:lnRef idx="1">
+            <a:schemeClr val="accent1"/>
+          </a:lnRef>
+          <a:fillRef idx="0">
+            <a:schemeClr val="accent1"/>
+          </a:fillRef>
+          <a:effectRef idx="0">
+            <a:schemeClr val="accent1"/>
+          </a:effectRef>
+          <a:fontRef idx="minor">
+            <a:schemeClr val="tx1"/>
+          </a:fontRef>
+        </p:style>
+      </p:cxnSp>
+    </p:spTree>
+    <p:extLst>
+      <p:ext uri="{BB962C8B-B14F-4D97-AF65-F5344CB8AC3E}">
+        <p14:creationId xmlns:p14="http://schemas.microsoft.com/office/powerpoint/2010/main" val="2915437618"/>
       </p:ext>
     </p:extLst>
   </p:cSld>

</xml_diff>